<commit_message>
small changes to slides
</commit_message>
<xml_diff>
--- a/slides/pands 0.0 introduction.pptx
+++ b/slides/pands 0.0 introduction.pptx
@@ -131,7 +131,7 @@
   <pc:docChgLst>
     <pc:chgData name="Andrew Beatty" userId="b3294954-d4b5-4a40-95d7-bd84a7c4023c" providerId="ADAL" clId="{193BE123-F18C-4DE9-8448-C2622DB71392}"/>
     <pc:docChg chg="custSel modSld">
-      <pc:chgData name="Andrew Beatty" userId="b3294954-d4b5-4a40-95d7-bd84a7c4023c" providerId="ADAL" clId="{193BE123-F18C-4DE9-8448-C2622DB71392}" dt="2022-01-16T12:59:33.115" v="351" actId="1076"/>
+      <pc:chgData name="Andrew Beatty" userId="b3294954-d4b5-4a40-95d7-bd84a7c4023c" providerId="ADAL" clId="{193BE123-F18C-4DE9-8448-C2622DB71392}" dt="2022-01-16T13:09:30.658" v="413" actId="20577"/>
       <pc:docMkLst>
         <pc:docMk/>
       </pc:docMkLst>
@@ -211,12 +211,20 @@
           </ac:picMkLst>
         </pc:picChg>
       </pc:sldChg>
-      <pc:sldChg chg="delSp modTransition modAnim">
-        <pc:chgData name="Andrew Beatty" userId="b3294954-d4b5-4a40-95d7-bd84a7c4023c" providerId="ADAL" clId="{193BE123-F18C-4DE9-8448-C2622DB71392}" dt="2022-01-16T12:57:27.313" v="334"/>
+      <pc:sldChg chg="delSp modSp mod modTransition modAnim">
+        <pc:chgData name="Andrew Beatty" userId="b3294954-d4b5-4a40-95d7-bd84a7c4023c" providerId="ADAL" clId="{193BE123-F18C-4DE9-8448-C2622DB71392}" dt="2022-01-16T13:09:30.658" v="413" actId="20577"/>
         <pc:sldMkLst>
           <pc:docMk/>
           <pc:sldMk cId="3922782727" sldId="260"/>
         </pc:sldMkLst>
+        <pc:spChg chg="mod">
+          <ac:chgData name="Andrew Beatty" userId="b3294954-d4b5-4a40-95d7-bd84a7c4023c" providerId="ADAL" clId="{193BE123-F18C-4DE9-8448-C2622DB71392}" dt="2022-01-16T13:09:30.658" v="413" actId="20577"/>
+          <ac:spMkLst>
+            <pc:docMk/>
+            <pc:sldMk cId="3922782727" sldId="260"/>
+            <ac:spMk id="3" creationId="{D35BB545-DAFA-4A36-A8F2-6D2E04B82DD3}"/>
+          </ac:spMkLst>
+        </pc:spChg>
         <pc:picChg chg="del">
           <ac:chgData name="Andrew Beatty" userId="b3294954-d4b5-4a40-95d7-bd84a7c4023c" providerId="ADAL" clId="{193BE123-F18C-4DE9-8448-C2622DB71392}" dt="2022-01-16T12:57:08.892" v="332"/>
           <ac:picMkLst>
@@ -4886,7 +4894,7 @@
             </a:pPr>
             <a:r>
               <a:rPr lang="en-IE" dirty="0"/>
-              <a:t>Installing Software</a:t>
+              <a:t>Installing Software:</a:t>
             </a:r>
           </a:p>
           <a:p>
@@ -4919,7 +4927,7 @@
             </a:pPr>
             <a:r>
               <a:rPr lang="en-IE" dirty="0"/>
-              <a:t>And on windows</a:t>
+              <a:t>And on windows (you will not need these if you are on a mac):</a:t>
             </a:r>
           </a:p>
           <a:p>
@@ -5243,21 +5251,6 @@
 </file>
 
 <file path=customXml/item1.xml><?xml version="1.0" encoding="utf-8"?>
-<?mso-contentType ?>
-<FormTemplates xmlns="http://schemas.microsoft.com/sharepoint/v3/contenttype/forms">
-  <Display>DocumentLibraryForm</Display>
-  <Edit>DocumentLibraryForm</Edit>
-  <New>DocumentLibraryForm</New>
-</FormTemplates>
-</file>
-
-<file path=customXml/item2.xml><?xml version="1.0" encoding="utf-8"?>
-<p:properties xmlns:p="http://schemas.microsoft.com/office/2006/metadata/properties" xmlns:xsi="http://www.w3.org/2001/XMLSchema-instance" xmlns:pc="http://schemas.microsoft.com/office/infopath/2007/PartnerControls">
-  <documentManagement/>
-</p:properties>
-</file>
-
-<file path=customXml/item3.xml><?xml version="1.0" encoding="utf-8"?>
 <ct:contentTypeSchema xmlns:ct="http://schemas.microsoft.com/office/2006/metadata/contentType" xmlns:ma="http://schemas.microsoft.com/office/2006/metadata/properties/metaAttributes" ct:_="" ma:_="" ma:contentTypeName="Document" ma:contentTypeID="0x010100C05BE44F8B11DE4F939C950F2FB86D25" ma:contentTypeVersion="11" ma:contentTypeDescription="Create a new document." ma:contentTypeScope="" ma:versionID="34395f23b8de4b16e096ba3e98d4229f">
   <xsd:schema xmlns:xsd="http://www.w3.org/2001/XMLSchema" xmlns:xs="http://www.w3.org/2001/XMLSchema" xmlns:p="http://schemas.microsoft.com/office/2006/metadata/properties" xmlns:ns3="022397c6-a0dd-4bd1-b5b2-3083c75319a8" xmlns:ns4="3b79411a-74a9-4456-bf24-7becf0a1874f" targetNamespace="http://schemas.microsoft.com/office/2006/metadata/properties" ma:root="true" ma:fieldsID="28687c8373083c78378f53178b130d56" ns3:_="" ns4:_="">
     <xsd:import namespace="022397c6-a0dd-4bd1-b5b2-3083c75319a8"/>
@@ -5466,24 +5459,22 @@
 </ct:contentTypeSchema>
 </file>
 
-<file path=customXml/itemProps1.xml><?xml version="1.0" encoding="utf-8"?>
-<ds:datastoreItem xmlns:ds="http://schemas.openxmlformats.org/officeDocument/2006/customXml" ds:itemID="{BF3BE34A-32C9-4C91-B1CF-33F70A7D8BAD}">
-  <ds:schemaRefs>
-    <ds:schemaRef ds:uri="http://schemas.microsoft.com/sharepoint/v3/contenttype/forms"/>
-  </ds:schemaRefs>
-</ds:datastoreItem>
+<file path=customXml/item2.xml><?xml version="1.0" encoding="utf-8"?>
+<p:properties xmlns:p="http://schemas.microsoft.com/office/2006/metadata/properties" xmlns:xsi="http://www.w3.org/2001/XMLSchema-instance" xmlns:pc="http://schemas.microsoft.com/office/infopath/2007/PartnerControls">
+  <documentManagement/>
+</p:properties>
 </file>
 
-<file path=customXml/itemProps2.xml><?xml version="1.0" encoding="utf-8"?>
-<ds:datastoreItem xmlns:ds="http://schemas.openxmlformats.org/officeDocument/2006/customXml" ds:itemID="{093F962E-2A62-4241-9ED6-8AA3A164CFB6}">
-  <ds:schemaRefs>
-    <ds:schemaRef ds:uri="http://schemas.microsoft.com/office/2006/metadata/properties"/>
-    <ds:schemaRef ds:uri="http://schemas.microsoft.com/office/infopath/2007/PartnerControls"/>
-  </ds:schemaRefs>
-</ds:datastoreItem>
+<file path=customXml/item3.xml><?xml version="1.0" encoding="utf-8"?>
+<?mso-contentType ?>
+<FormTemplates xmlns="http://schemas.microsoft.com/sharepoint/v3/contenttype/forms">
+  <Display>DocumentLibraryForm</Display>
+  <Edit>DocumentLibraryForm</Edit>
+  <New>DocumentLibraryForm</New>
+</FormTemplates>
 </file>
 
-<file path=customXml/itemProps3.xml><?xml version="1.0" encoding="utf-8"?>
+<file path=customXml/itemProps1.xml><?xml version="1.0" encoding="utf-8"?>
 <ds:datastoreItem xmlns:ds="http://schemas.openxmlformats.org/officeDocument/2006/customXml" ds:itemID="{B7E7B250-A0BB-4D63-9061-469A9AC3CBB1}">
   <ds:schemaRefs>
     <ds:schemaRef ds:uri="http://schemas.microsoft.com/office/2006/metadata/contentType"/>
@@ -5500,4 +5491,21 @@
     <ds:schemaRef ds:uri="http://schemas.microsoft.com/internal/obd"/>
   </ds:schemaRefs>
 </ds:datastoreItem>
+</file>
+
+<file path=customXml/itemProps2.xml><?xml version="1.0" encoding="utf-8"?>
+<ds:datastoreItem xmlns:ds="http://schemas.openxmlformats.org/officeDocument/2006/customXml" ds:itemID="{093F962E-2A62-4241-9ED6-8AA3A164CFB6}">
+  <ds:schemaRefs>
+    <ds:schemaRef ds:uri="http://schemas.microsoft.com/office/2006/metadata/properties"/>
+    <ds:schemaRef ds:uri="http://schemas.microsoft.com/office/infopath/2007/PartnerControls"/>
+  </ds:schemaRefs>
+</ds:datastoreItem>
+</file>
+
+<file path=customXml/itemProps3.xml><?xml version="1.0" encoding="utf-8"?>
+<ds:datastoreItem xmlns:ds="http://schemas.openxmlformats.org/officeDocument/2006/customXml" ds:itemID="{BF3BE34A-32C9-4C91-B1CF-33F70A7D8BAD}">
+  <ds:schemaRefs>
+    <ds:schemaRef ds:uri="http://schemas.microsoft.com/sharepoint/v3/contenttype/forms"/>
+  </ds:schemaRefs>
+</ds:datastoreItem>
 </file>
</xml_diff>